<commit_message>
success File Transfer and Play
</commit_message>
<xml_diff>
--- a/homework2.pptx
+++ b/homework2.pptx
@@ -160,7 +160,7 @@
   </p:defaultTextStyle>
   <p:extLst>
     <p:ext uri="{EFAFB233-063F-42B5-8137-9DF3F51BA10A}">
-      <p15:sldGuideLst xmlns:p15="http://schemas.microsoft.com/office/powerpoint/2012/main" xmlns="">
+      <p15:sldGuideLst xmlns="" xmlns:p15="http://schemas.microsoft.com/office/powerpoint/2012/main">
         <p15:guide id="1" orient="horz" pos="2160">
           <p15:clr>
             <a:srgbClr val="A4A3A4"/>
@@ -264,7 +264,7 @@
             <a:fld id="{223955AB-2899-44F2-A6FC-CCFB4BB1D95C}" type="datetimeFigureOut">
               <a:rPr lang="ko-KR" altLang="en-US" smtClean="0"/>
               <a:pPr/>
-              <a:t>2017-04-16</a:t>
+              <a:t>2017-04-23</a:t>
             </a:fld>
             <a:endParaRPr lang="ko-KR" altLang="en-US"/>
           </a:p>
@@ -434,7 +434,7 @@
     </p:spTree>
     <p:extLst>
       <p:ext uri="{BB962C8B-B14F-4D97-AF65-F5344CB8AC3E}">
-        <p14:creationId xmlns:p14="http://schemas.microsoft.com/office/powerpoint/2010/main" xmlns="" val="1217709706"/>
+        <p14:creationId xmlns="" xmlns:p14="http://schemas.microsoft.com/office/powerpoint/2010/main" val="1217709706"/>
       </p:ext>
     </p:extLst>
   </p:cSld>
@@ -609,7 +609,7 @@
     </p:spTree>
     <p:extLst>
       <p:ext uri="{BB962C8B-B14F-4D97-AF65-F5344CB8AC3E}">
-        <p14:creationId xmlns:p14="http://schemas.microsoft.com/office/powerpoint/2010/main" xmlns="" val="3226560588"/>
+        <p14:creationId xmlns="" xmlns:p14="http://schemas.microsoft.com/office/powerpoint/2010/main" val="3226560588"/>
       </p:ext>
     </p:extLst>
   </p:cSld>
@@ -694,7 +694,7 @@
     </p:spTree>
     <p:extLst>
       <p:ext uri="{BB962C8B-B14F-4D97-AF65-F5344CB8AC3E}">
-        <p14:creationId xmlns:p14="http://schemas.microsoft.com/office/powerpoint/2010/main" xmlns="" val="1930782035"/>
+        <p14:creationId xmlns="" xmlns:p14="http://schemas.microsoft.com/office/powerpoint/2010/main" val="1930782035"/>
       </p:ext>
     </p:extLst>
   </p:cSld>
@@ -779,7 +779,7 @@
     </p:spTree>
     <p:extLst>
       <p:ext uri="{BB962C8B-B14F-4D97-AF65-F5344CB8AC3E}">
-        <p14:creationId xmlns:p14="http://schemas.microsoft.com/office/powerpoint/2010/main" xmlns="" val="3304278014"/>
+        <p14:creationId xmlns="" xmlns:p14="http://schemas.microsoft.com/office/powerpoint/2010/main" val="3304278014"/>
       </p:ext>
     </p:extLst>
   </p:cSld>
@@ -864,7 +864,7 @@
     </p:spTree>
     <p:extLst>
       <p:ext uri="{BB962C8B-B14F-4D97-AF65-F5344CB8AC3E}">
-        <p14:creationId xmlns:p14="http://schemas.microsoft.com/office/powerpoint/2010/main" xmlns="" val="198817927"/>
+        <p14:creationId xmlns="" xmlns:p14="http://schemas.microsoft.com/office/powerpoint/2010/main" val="198817927"/>
       </p:ext>
     </p:extLst>
   </p:cSld>
@@ -1078,7 +1078,7 @@
               <a:pPr>
                 <a:defRPr/>
               </a:pPr>
-              <a:t>2017-04-16</a:t>
+              <a:t>2017-04-23</a:t>
             </a:fld>
             <a:endParaRPr lang="ko-KR" altLang="en-US"/>
           </a:p>
@@ -1280,7 +1280,7 @@
               <a:pPr>
                 <a:defRPr/>
               </a:pPr>
-              <a:t>2017-04-16</a:t>
+              <a:t>2017-04-23</a:t>
             </a:fld>
             <a:endParaRPr lang="ko-KR" altLang="en-US"/>
           </a:p>
@@ -1486,7 +1486,7 @@
               <a:pPr>
                 <a:defRPr/>
               </a:pPr>
-              <a:t>2017-04-16</a:t>
+              <a:t>2017-04-23</a:t>
             </a:fld>
             <a:endParaRPr lang="ko-KR" altLang="en-US"/>
           </a:p>
@@ -1682,7 +1682,7 @@
               <a:pPr>
                 <a:defRPr/>
               </a:pPr>
-              <a:t>2017-04-16</a:t>
+              <a:t>2017-04-23</a:t>
             </a:fld>
             <a:endParaRPr lang="ko-KR" altLang="en-US"/>
           </a:p>
@@ -1901,7 +1901,7 @@
               <a:pPr>
                 <a:defRPr/>
               </a:pPr>
-              <a:t>2017-04-16</a:t>
+              <a:t>2017-04-23</a:t>
             </a:fld>
             <a:endParaRPr lang="ko-KR" altLang="en-US"/>
           </a:p>
@@ -2214,7 +2214,7 @@
               <a:pPr>
                 <a:defRPr/>
               </a:pPr>
-              <a:t>2017-04-16</a:t>
+              <a:t>2017-04-23</a:t>
             </a:fld>
             <a:endParaRPr lang="ko-KR" altLang="en-US"/>
           </a:p>
@@ -2666,7 +2666,7 @@
               <a:pPr>
                 <a:defRPr/>
               </a:pPr>
-              <a:t>2017-04-16</a:t>
+              <a:t>2017-04-23</a:t>
             </a:fld>
             <a:endParaRPr lang="ko-KR" altLang="en-US"/>
           </a:p>
@@ -2811,7 +2811,7 @@
               <a:pPr>
                 <a:defRPr/>
               </a:pPr>
-              <a:t>2017-04-16</a:t>
+              <a:t>2017-04-23</a:t>
             </a:fld>
             <a:endParaRPr lang="ko-KR" altLang="en-US"/>
           </a:p>
@@ -2934,7 +2934,7 @@
               <a:pPr>
                 <a:defRPr/>
               </a:pPr>
-              <a:t>2017-04-16</a:t>
+              <a:t>2017-04-23</a:t>
             </a:fld>
             <a:endParaRPr lang="ko-KR" altLang="en-US"/>
           </a:p>
@@ -3237,7 +3237,7 @@
               <a:pPr>
                 <a:defRPr/>
               </a:pPr>
-              <a:t>2017-04-16</a:t>
+              <a:t>2017-04-23</a:t>
             </a:fld>
             <a:endParaRPr lang="ko-KR" altLang="en-US"/>
           </a:p>
@@ -3521,7 +3521,7 @@
               <a:pPr>
                 <a:defRPr/>
               </a:pPr>
-              <a:t>2017-04-16</a:t>
+              <a:t>2017-04-23</a:t>
             </a:fld>
             <a:endParaRPr lang="ko-KR" altLang="en-US"/>
           </a:p>
@@ -3875,7 +3875,7 @@
               <a:pPr>
                 <a:defRPr/>
               </a:pPr>
-              <a:t>2017-04-16</a:t>
+              <a:t>2017-04-23</a:t>
             </a:fld>
             <a:endParaRPr lang="ko-KR" altLang="en-US"/>
           </a:p>
@@ -5178,7 +5178,7 @@
     </p:spTree>
     <p:extLst>
       <p:ext uri="{BB962C8B-B14F-4D97-AF65-F5344CB8AC3E}">
-        <p14:creationId xmlns:p14="http://schemas.microsoft.com/office/powerpoint/2010/main" xmlns="" val="378639265"/>
+        <p14:creationId xmlns="" xmlns:p14="http://schemas.microsoft.com/office/powerpoint/2010/main" val="378639265"/>
       </p:ext>
     </p:extLst>
   </p:cSld>
@@ -5781,7 +5781,7 @@
     </p:spTree>
     <p:extLst>
       <p:ext uri="{BB962C8B-B14F-4D97-AF65-F5344CB8AC3E}">
-        <p14:creationId xmlns:p14="http://schemas.microsoft.com/office/powerpoint/2010/main" xmlns="" val="859056039"/>
+        <p14:creationId xmlns="" xmlns:p14="http://schemas.microsoft.com/office/powerpoint/2010/main" val="859056039"/>
       </p:ext>
     </p:extLst>
   </p:cSld>
@@ -6351,7 +6351,7 @@
     </p:spTree>
     <p:extLst>
       <p:ext uri="{BB962C8B-B14F-4D97-AF65-F5344CB8AC3E}">
-        <p14:creationId xmlns:p14="http://schemas.microsoft.com/office/powerpoint/2010/main" xmlns="" val="4277735612"/>
+        <p14:creationId xmlns="" xmlns:p14="http://schemas.microsoft.com/office/powerpoint/2010/main" val="4277735612"/>
       </p:ext>
     </p:extLst>
   </p:cSld>
@@ -6724,7 +6724,7 @@
     </p:spTree>
     <p:extLst>
       <p:ext uri="{BB962C8B-B14F-4D97-AF65-F5344CB8AC3E}">
-        <p14:creationId xmlns:p14="http://schemas.microsoft.com/office/powerpoint/2010/main" xmlns="" val="3771524814"/>
+        <p14:creationId xmlns="" xmlns:p14="http://schemas.microsoft.com/office/powerpoint/2010/main" val="3771524814"/>
       </p:ext>
     </p:extLst>
   </p:cSld>
@@ -6972,42 +6972,42 @@
           <a:p>
             <a:pPr lvl="2" eaLnBrk="1" hangingPunct="1"/>
             <a:r>
-              <a:rPr lang="en-US" altLang="ko-KR" sz="1400" dirty="0">
+              <a:rPr lang="en-US" altLang="ko-KR" sz="1400" strike="sngStrike" dirty="0">
                 <a:latin typeface="맑은 고딕" panose="020B0503020000020004" pitchFamily="50" charset="-127"/>
                 <a:ea typeface="맑은 고딕" panose="020B0503020000020004" pitchFamily="50" charset="-127"/>
               </a:rPr>
               <a:t>Play </a:t>
             </a:r>
             <a:r>
-              <a:rPr lang="ko-KR" altLang="en-US" sz="1400" dirty="0">
+              <a:rPr lang="ko-KR" altLang="en-US" sz="1400" strike="sngStrike" dirty="0">
                 <a:latin typeface="맑은 고딕" panose="020B0503020000020004" pitchFamily="50" charset="-127"/>
                 <a:ea typeface="맑은 고딕" panose="020B0503020000020004" pitchFamily="50" charset="-127"/>
               </a:rPr>
               <a:t>버튼 </a:t>
             </a:r>
             <a:r>
-              <a:rPr lang="en-US" altLang="ko-KR" sz="1400" dirty="0">
+              <a:rPr lang="en-US" altLang="ko-KR" sz="1400" strike="sngStrike" dirty="0">
                 <a:latin typeface="맑은 고딕" panose="020B0503020000020004" pitchFamily="50" charset="-127"/>
                 <a:ea typeface="맑은 고딕" panose="020B0503020000020004" pitchFamily="50" charset="-127"/>
               </a:rPr>
               <a:t>: Play</a:t>
             </a:r>
             <a:r>
-              <a:rPr lang="ko-KR" altLang="en-US" sz="1400" dirty="0">
+              <a:rPr lang="ko-KR" altLang="en-US" sz="1400" strike="sngStrike" dirty="0">
                 <a:latin typeface="맑은 고딕" panose="020B0503020000020004" pitchFamily="50" charset="-127"/>
                 <a:ea typeface="맑은 고딕" panose="020B0503020000020004" pitchFamily="50" charset="-127"/>
               </a:rPr>
               <a:t> </a:t>
             </a:r>
             <a:r>
-              <a:rPr lang="en-US" altLang="ko-KR" sz="1400" dirty="0">
+              <a:rPr lang="en-US" altLang="ko-KR" sz="1400" strike="sngStrike" dirty="0">
                 <a:latin typeface="맑은 고딕" panose="020B0503020000020004" pitchFamily="50" charset="-127"/>
                 <a:ea typeface="맑은 고딕" panose="020B0503020000020004" pitchFamily="50" charset="-127"/>
               </a:rPr>
               <a:t>List</a:t>
             </a:r>
             <a:r>
-              <a:rPr lang="ko-KR" altLang="en-US" sz="1400" dirty="0">
+              <a:rPr lang="ko-KR" altLang="en-US" sz="1400" strike="sngStrike" dirty="0">
                 <a:latin typeface="맑은 고딕" panose="020B0503020000020004" pitchFamily="50" charset="-127"/>
                 <a:ea typeface="맑은 고딕" panose="020B0503020000020004" pitchFamily="50" charset="-127"/>
               </a:rPr>
@@ -7098,21 +7098,21 @@
           <a:p>
             <a:pPr lvl="2" eaLnBrk="1" hangingPunct="1"/>
             <a:r>
-              <a:rPr lang="ko-KR" altLang="en-US" sz="1400" dirty="0">
+              <a:rPr lang="ko-KR" altLang="en-US" sz="1400" strike="sngStrike" dirty="0">
                 <a:latin typeface="맑은 고딕" panose="020B0503020000020004" pitchFamily="50" charset="-127"/>
                 <a:ea typeface="맑은 고딕" panose="020B0503020000020004" pitchFamily="50" charset="-127"/>
               </a:rPr>
               <a:t>음악 재생 구간에 따라 </a:t>
             </a:r>
             <a:r>
-              <a:rPr lang="en-US" altLang="ko-KR" sz="1400" dirty="0">
+              <a:rPr lang="en-US" altLang="ko-KR" sz="1400" strike="sngStrike" dirty="0">
                 <a:latin typeface="맑은 고딕" panose="020B0503020000020004" pitchFamily="50" charset="-127"/>
                 <a:ea typeface="맑은 고딕" panose="020B0503020000020004" pitchFamily="50" charset="-127"/>
               </a:rPr>
               <a:t>track bar</a:t>
             </a:r>
             <a:r>
-              <a:rPr lang="ko-KR" altLang="en-US" sz="1400" dirty="0">
+              <a:rPr lang="ko-KR" altLang="en-US" sz="1400" strike="sngStrike" dirty="0">
                 <a:latin typeface="맑은 고딕" panose="020B0503020000020004" pitchFamily="50" charset="-127"/>
                 <a:ea typeface="맑은 고딕" panose="020B0503020000020004" pitchFamily="50" charset="-127"/>
               </a:rPr>
@@ -7481,7 +7481,7 @@
     </p:spTree>
     <p:extLst>
       <p:ext uri="{BB962C8B-B14F-4D97-AF65-F5344CB8AC3E}">
-        <p14:creationId xmlns:p14="http://schemas.microsoft.com/office/powerpoint/2010/main" xmlns="" val="3316967563"/>
+        <p14:creationId xmlns="" xmlns:p14="http://schemas.microsoft.com/office/powerpoint/2010/main" val="3316967563"/>
       </p:ext>
     </p:extLst>
   </p:cSld>
@@ -7700,35 +7700,35 @@
           <a:p>
             <a:pPr lvl="2" eaLnBrk="1" hangingPunct="1"/>
             <a:r>
-              <a:rPr lang="en-US" altLang="ko-KR" sz="1400" dirty="0" err="1">
+              <a:rPr lang="en-US" altLang="ko-KR" sz="1400" strike="sngStrike" dirty="0" err="1">
                 <a:latin typeface="맑은 고딕" panose="020B0503020000020004" pitchFamily="50" charset="-127"/>
                 <a:ea typeface="맑은 고딕" panose="020B0503020000020004" pitchFamily="50" charset="-127"/>
               </a:rPr>
               <a:t>Prev</a:t>
             </a:r>
             <a:r>
-              <a:rPr lang="en-US" altLang="ko-KR" sz="1400" dirty="0">
+              <a:rPr lang="en-US" altLang="ko-KR" sz="1400" strike="sngStrike" dirty="0">
                 <a:latin typeface="맑은 고딕" panose="020B0503020000020004" pitchFamily="50" charset="-127"/>
                 <a:ea typeface="맑은 고딕" panose="020B0503020000020004" pitchFamily="50" charset="-127"/>
               </a:rPr>
               <a:t> </a:t>
             </a:r>
             <a:r>
-              <a:rPr lang="ko-KR" altLang="en-US" sz="1400" dirty="0">
+              <a:rPr lang="ko-KR" altLang="en-US" sz="1400" strike="sngStrike" dirty="0">
                 <a:latin typeface="맑은 고딕" panose="020B0503020000020004" pitchFamily="50" charset="-127"/>
                 <a:ea typeface="맑은 고딕" panose="020B0503020000020004" pitchFamily="50" charset="-127"/>
               </a:rPr>
               <a:t>버튼 </a:t>
             </a:r>
             <a:r>
-              <a:rPr lang="en-US" altLang="ko-KR" sz="1400" dirty="0">
+              <a:rPr lang="en-US" altLang="ko-KR" sz="1400" strike="sngStrike" dirty="0">
                 <a:latin typeface="맑은 고딕" panose="020B0503020000020004" pitchFamily="50" charset="-127"/>
                 <a:ea typeface="맑은 고딕" panose="020B0503020000020004" pitchFamily="50" charset="-127"/>
               </a:rPr>
               <a:t>: </a:t>
             </a:r>
             <a:r>
-              <a:rPr lang="ko-KR" altLang="en-US" sz="1400" dirty="0">
+              <a:rPr lang="ko-KR" altLang="en-US" sz="1400" strike="sngStrike" dirty="0">
                 <a:latin typeface="맑은 고딕" panose="020B0503020000020004" pitchFamily="50" charset="-127"/>
                 <a:ea typeface="맑은 고딕" panose="020B0503020000020004" pitchFamily="50" charset="-127"/>
               </a:rPr>
@@ -7763,32 +7763,39 @@
           <a:p>
             <a:pPr lvl="2" eaLnBrk="1" hangingPunct="1"/>
             <a:r>
-              <a:rPr lang="en-US" altLang="ko-KR" sz="1400" dirty="0">
+              <a:rPr lang="en-US" altLang="ko-KR" sz="1400" strike="sngStrike" dirty="0">
                 <a:latin typeface="맑은 고딕" panose="020B0503020000020004" pitchFamily="50" charset="-127"/>
                 <a:ea typeface="맑은 고딕" panose="020B0503020000020004" pitchFamily="50" charset="-127"/>
               </a:rPr>
               <a:t>Next </a:t>
             </a:r>
             <a:r>
+              <a:rPr lang="ko-KR" altLang="en-US" sz="1400" strike="sngStrike" dirty="0">
+                <a:latin typeface="맑은 고딕" panose="020B0503020000020004" pitchFamily="50" charset="-127"/>
+                <a:ea typeface="맑은 고딕" panose="020B0503020000020004" pitchFamily="50" charset="-127"/>
+              </a:rPr>
+              <a:t>버튼 </a:t>
+            </a:r>
+            <a:r>
+              <a:rPr lang="en-US" altLang="ko-KR" sz="1400" strike="sngStrike" dirty="0">
+                <a:latin typeface="맑은 고딕" panose="020B0503020000020004" pitchFamily="50" charset="-127"/>
+                <a:ea typeface="맑은 고딕" panose="020B0503020000020004" pitchFamily="50" charset="-127"/>
+              </a:rPr>
+              <a:t>: </a:t>
+            </a:r>
+            <a:r>
+              <a:rPr lang="ko-KR" altLang="en-US" sz="1400" strike="sngStrike" dirty="0">
+                <a:latin typeface="맑은 고딕" panose="020B0503020000020004" pitchFamily="50" charset="-127"/>
+                <a:ea typeface="맑은 고딕" panose="020B0503020000020004" pitchFamily="50" charset="-127"/>
+              </a:rPr>
+              <a:t>현재 재생중인 곡의 다음 곡 재생</a:t>
+            </a:r>
+            <a:r>
               <a:rPr lang="ko-KR" altLang="en-US" sz="1400" dirty="0">
                 <a:latin typeface="맑은 고딕" panose="020B0503020000020004" pitchFamily="50" charset="-127"/>
                 <a:ea typeface="맑은 고딕" panose="020B0503020000020004" pitchFamily="50" charset="-127"/>
               </a:rPr>
-              <a:t>버튼 </a:t>
-            </a:r>
-            <a:r>
-              <a:rPr lang="en-US" altLang="ko-KR" sz="1400" dirty="0">
-                <a:latin typeface="맑은 고딕" panose="020B0503020000020004" pitchFamily="50" charset="-127"/>
-                <a:ea typeface="맑은 고딕" panose="020B0503020000020004" pitchFamily="50" charset="-127"/>
-              </a:rPr>
-              <a:t>: </a:t>
-            </a:r>
-            <a:r>
-              <a:rPr lang="ko-KR" altLang="en-US" sz="1400" dirty="0">
-                <a:latin typeface="맑은 고딕" panose="020B0503020000020004" pitchFamily="50" charset="-127"/>
-                <a:ea typeface="맑은 고딕" panose="020B0503020000020004" pitchFamily="50" charset="-127"/>
-              </a:rPr>
-              <a:t>현재 재생중인 곡의 다음 곡 재생 </a:t>
+              <a:t> </a:t>
             </a:r>
             <a:r>
               <a:rPr lang="en-US" altLang="ko-KR" sz="1400" b="1" dirty="0">
@@ -7819,11 +7826,18 @@
           <a:p>
             <a:pPr lvl="2" eaLnBrk="1" hangingPunct="1"/>
             <a:r>
+              <a:rPr lang="ko-KR" altLang="en-US" sz="1400" strike="sngStrike" dirty="0">
+                <a:latin typeface="맑은 고딕" panose="020B0503020000020004" pitchFamily="50" charset="-127"/>
+                <a:ea typeface="맑은 고딕" panose="020B0503020000020004" pitchFamily="50" charset="-127"/>
+              </a:rPr>
+              <a:t>재생할 이전 혹은 다음 곡이 없으면 에러</a:t>
+            </a:r>
+            <a:r>
               <a:rPr lang="ko-KR" altLang="en-US" sz="1400" dirty="0">
                 <a:latin typeface="맑은 고딕" panose="020B0503020000020004" pitchFamily="50" charset="-127"/>
                 <a:ea typeface="맑은 고딕" panose="020B0503020000020004" pitchFamily="50" charset="-127"/>
               </a:rPr>
-              <a:t>재생할 이전 혹은 다음 곡이 없으면 에러 </a:t>
+              <a:t> </a:t>
             </a:r>
             <a:r>
               <a:rPr lang="en-US" altLang="ko-KR" sz="1400" b="1" dirty="0">
@@ -8047,7 +8061,7 @@
     </p:spTree>
     <p:extLst>
       <p:ext uri="{BB962C8B-B14F-4D97-AF65-F5344CB8AC3E}">
-        <p14:creationId xmlns:p14="http://schemas.microsoft.com/office/powerpoint/2010/main" xmlns="" val="2906483687"/>
+        <p14:creationId xmlns="" xmlns:p14="http://schemas.microsoft.com/office/powerpoint/2010/main" val="2906483687"/>
       </p:ext>
     </p:extLst>
   </p:cSld>
@@ -8626,7 +8640,7 @@
     </p:spTree>
     <p:extLst>
       <p:ext uri="{BB962C8B-B14F-4D97-AF65-F5344CB8AC3E}">
-        <p14:creationId xmlns:p14="http://schemas.microsoft.com/office/powerpoint/2010/main" xmlns="" val="2585376067"/>
+        <p14:creationId xmlns="" xmlns:p14="http://schemas.microsoft.com/office/powerpoint/2010/main" val="2585376067"/>
       </p:ext>
     </p:extLst>
   </p:cSld>
@@ -9144,7 +9158,7 @@
     </p:spTree>
     <p:extLst>
       <p:ext uri="{BB962C8B-B14F-4D97-AF65-F5344CB8AC3E}">
-        <p14:creationId xmlns:p14="http://schemas.microsoft.com/office/powerpoint/2010/main" xmlns="" val="3108931165"/>
+        <p14:creationId xmlns="" xmlns:p14="http://schemas.microsoft.com/office/powerpoint/2010/main" val="3108931165"/>
       </p:ext>
     </p:extLst>
   </p:cSld>
@@ -9485,7 +9499,7 @@
     </p:spTree>
     <p:extLst>
       <p:ext uri="{BB962C8B-B14F-4D97-AF65-F5344CB8AC3E}">
-        <p14:creationId xmlns:p14="http://schemas.microsoft.com/office/powerpoint/2010/main" xmlns="" val="2324109924"/>
+        <p14:creationId xmlns="" xmlns:p14="http://schemas.microsoft.com/office/powerpoint/2010/main" val="2324109924"/>
       </p:ext>
     </p:extLst>
   </p:cSld>
@@ -9882,7 +9896,7 @@
     </p:spTree>
     <p:extLst>
       <p:ext uri="{BB962C8B-B14F-4D97-AF65-F5344CB8AC3E}">
-        <p14:creationId xmlns:p14="http://schemas.microsoft.com/office/powerpoint/2010/main" xmlns="" val="4156804516"/>
+        <p14:creationId xmlns="" xmlns:p14="http://schemas.microsoft.com/office/powerpoint/2010/main" val="4156804516"/>
       </p:ext>
     </p:extLst>
   </p:cSld>
@@ -10374,7 +10388,7 @@
     </p:spTree>
     <p:extLst>
       <p:ext uri="{BB962C8B-B14F-4D97-AF65-F5344CB8AC3E}">
-        <p14:creationId xmlns:p14="http://schemas.microsoft.com/office/powerpoint/2010/main" xmlns="" val="4212199003"/>
+        <p14:creationId xmlns="" xmlns:p14="http://schemas.microsoft.com/office/powerpoint/2010/main" val="4212199003"/>
       </p:ext>
     </p:extLst>
   </p:cSld>
@@ -10566,7 +10580,7 @@
     </p:spTree>
     <p:extLst>
       <p:ext uri="{BB962C8B-B14F-4D97-AF65-F5344CB8AC3E}">
-        <p14:creationId xmlns:p14="http://schemas.microsoft.com/office/powerpoint/2010/main" xmlns="" val="595206157"/>
+        <p14:creationId xmlns="" xmlns:p14="http://schemas.microsoft.com/office/powerpoint/2010/main" val="595206157"/>
       </p:ext>
     </p:extLst>
   </p:cSld>
@@ -11071,7 +11085,7 @@
     </p:spTree>
     <p:extLst>
       <p:ext uri="{BB962C8B-B14F-4D97-AF65-F5344CB8AC3E}">
-        <p14:creationId xmlns:p14="http://schemas.microsoft.com/office/powerpoint/2010/main" xmlns="" val="871749106"/>
+        <p14:creationId xmlns="" xmlns:p14="http://schemas.microsoft.com/office/powerpoint/2010/main" val="871749106"/>
       </p:ext>
     </p:extLst>
   </p:cSld>
@@ -11666,7 +11680,7 @@
     </p:spTree>
     <p:extLst>
       <p:ext uri="{BB962C8B-B14F-4D97-AF65-F5344CB8AC3E}">
-        <p14:creationId xmlns:p14="http://schemas.microsoft.com/office/powerpoint/2010/main" xmlns="" val="269573667"/>
+        <p14:creationId xmlns="" xmlns:p14="http://schemas.microsoft.com/office/powerpoint/2010/main" val="269573667"/>
       </p:ext>
     </p:extLst>
   </p:cSld>
@@ -12677,7 +12691,7 @@
     </p:spTree>
     <p:extLst>
       <p:ext uri="{BB962C8B-B14F-4D97-AF65-F5344CB8AC3E}">
-        <p14:creationId xmlns:p14="http://schemas.microsoft.com/office/powerpoint/2010/main" xmlns="" val="3333039100"/>
+        <p14:creationId xmlns="" xmlns:p14="http://schemas.microsoft.com/office/powerpoint/2010/main" val="3333039100"/>
       </p:ext>
     </p:extLst>
   </p:cSld>
@@ -13469,7 +13483,7 @@
     </p:spTree>
     <p:extLst>
       <p:ext uri="{BB962C8B-B14F-4D97-AF65-F5344CB8AC3E}">
-        <p14:creationId xmlns:p14="http://schemas.microsoft.com/office/powerpoint/2010/main" xmlns="" val="2114961475"/>
+        <p14:creationId xmlns="" xmlns:p14="http://schemas.microsoft.com/office/powerpoint/2010/main" val="2114961475"/>
       </p:ext>
     </p:extLst>
   </p:cSld>
@@ -14040,7 +14054,7 @@
     </p:spTree>
     <p:extLst>
       <p:ext uri="{BB962C8B-B14F-4D97-AF65-F5344CB8AC3E}">
-        <p14:creationId xmlns:p14="http://schemas.microsoft.com/office/powerpoint/2010/main" xmlns="" val="3558949813"/>
+        <p14:creationId xmlns="" xmlns:p14="http://schemas.microsoft.com/office/powerpoint/2010/main" val="3558949813"/>
       </p:ext>
     </p:extLst>
   </p:cSld>
@@ -14594,7 +14608,7 @@
     </p:spTree>
     <p:extLst>
       <p:ext uri="{BB962C8B-B14F-4D97-AF65-F5344CB8AC3E}">
-        <p14:creationId xmlns:p14="http://schemas.microsoft.com/office/powerpoint/2010/main" xmlns="" val="2598933287"/>
+        <p14:creationId xmlns="" xmlns:p14="http://schemas.microsoft.com/office/powerpoint/2010/main" val="2598933287"/>
       </p:ext>
     </p:extLst>
   </p:cSld>
@@ -14976,7 +14990,7 @@
     </p:spTree>
     <p:extLst>
       <p:ext uri="{BB962C8B-B14F-4D97-AF65-F5344CB8AC3E}">
-        <p14:creationId xmlns:p14="http://schemas.microsoft.com/office/powerpoint/2010/main" xmlns="" val="1615747074"/>
+        <p14:creationId xmlns="" xmlns:p14="http://schemas.microsoft.com/office/powerpoint/2010/main" val="1615747074"/>
       </p:ext>
     </p:extLst>
   </p:cSld>

</xml_diff>